<commit_message>
:sparkles: Add icon image
</commit_message>
<xml_diff>
--- a/media/logo.pptx
+++ b/media/logo.pptx
@@ -6,7 +6,8 @@
   </p:sldMasterIdLst>
   <p:sldIdLst>
     <p:sldId id="257" r:id="rId2"/>
-    <p:sldId id="258" r:id="rId3"/>
+    <p:sldId id="259" r:id="rId3"/>
+    <p:sldId id="258" r:id="rId4"/>
   </p:sldIdLst>
   <p:sldSz cx="9944100" cy="9942513"/>
   <p:notesSz cx="6858000" cy="9144000"/>
@@ -3315,6 +3316,420 @@
           <a:chExt cx="0" cy="0"/>
         </a:xfrm>
       </p:grpSpPr>
+      <p:sp>
+        <p:nvSpPr>
+          <p:cNvPr id="10" name="Rectangle 9">
+            <a:extLst>
+              <a:ext uri="{FF2B5EF4-FFF2-40B4-BE49-F238E27FC236}">
+                <a16:creationId xmlns:a16="http://schemas.microsoft.com/office/drawing/2014/main" id="{ADB86A60-AEF4-8348-9B2D-8D400A2098AE}"/>
+              </a:ext>
+            </a:extLst>
+          </p:cNvPr>
+          <p:cNvSpPr/>
+          <p:nvPr/>
+        </p:nvSpPr>
+        <p:spPr>
+          <a:xfrm>
+            <a:off x="0" y="0"/>
+            <a:ext cx="9944100" cy="9942513"/>
+          </a:xfrm>
+          <a:prstGeom prst="rect">
+            <a:avLst/>
+          </a:prstGeom>
+          <a:solidFill>
+            <a:schemeClr val="tx1"/>
+          </a:solidFill>
+        </p:spPr>
+        <p:style>
+          <a:lnRef idx="2">
+            <a:schemeClr val="accent1">
+              <a:shade val="50000"/>
+            </a:schemeClr>
+          </a:lnRef>
+          <a:fillRef idx="1">
+            <a:schemeClr val="accent1"/>
+          </a:fillRef>
+          <a:effectRef idx="0">
+            <a:schemeClr val="accent1"/>
+          </a:effectRef>
+          <a:fontRef idx="minor">
+            <a:schemeClr val="lt1"/>
+          </a:fontRef>
+        </p:style>
+        <p:txBody>
+          <a:bodyPr rtlCol="0" anchor="ctr"/>
+          <a:lstStyle/>
+          <a:p>
+            <a:pPr algn="ctr"/>
+            <a:endParaRPr lang="en-US"/>
+          </a:p>
+        </p:txBody>
+      </p:sp>
+      <p:grpSp>
+        <p:nvGrpSpPr>
+          <p:cNvPr id="12" name="Group 11">
+            <a:extLst>
+              <a:ext uri="{FF2B5EF4-FFF2-40B4-BE49-F238E27FC236}">
+                <a16:creationId xmlns:a16="http://schemas.microsoft.com/office/drawing/2014/main" id="{BCA6E9CB-E443-3B4C-998C-F51ACBA6ACCD}"/>
+              </a:ext>
+            </a:extLst>
+          </p:cNvPr>
+          <p:cNvGrpSpPr/>
+          <p:nvPr/>
+        </p:nvGrpSpPr>
+        <p:grpSpPr>
+          <a:xfrm>
+            <a:off x="1225084" y="1744343"/>
+            <a:ext cx="7200000" cy="7200000"/>
+            <a:chOff x="1225084" y="1744343"/>
+            <a:chExt cx="7200000" cy="7200000"/>
+          </a:xfrm>
+        </p:grpSpPr>
+        <p:sp>
+          <p:nvSpPr>
+            <p:cNvPr id="9" name="Oval 8">
+              <a:extLst>
+                <a:ext uri="{FF2B5EF4-FFF2-40B4-BE49-F238E27FC236}">
+                  <a16:creationId xmlns:a16="http://schemas.microsoft.com/office/drawing/2014/main" id="{3F9A8C7F-965D-AE4C-A85B-FA2C393513CC}"/>
+                </a:ext>
+              </a:extLst>
+            </p:cNvPr>
+            <p:cNvSpPr>
+              <a:spLocks noChangeAspect="1"/>
+            </p:cNvSpPr>
+            <p:nvPr/>
+          </p:nvSpPr>
+          <p:spPr>
+            <a:xfrm>
+              <a:off x="1225084" y="1744343"/>
+              <a:ext cx="7200000" cy="7200000"/>
+            </a:xfrm>
+            <a:prstGeom prst="ellipse">
+              <a:avLst/>
+            </a:prstGeom>
+            <a:gradFill flip="none" rotWithShape="1">
+              <a:gsLst>
+                <a:gs pos="0">
+                  <a:schemeClr val="tx1">
+                    <a:lumMod val="85000"/>
+                    <a:lumOff val="15000"/>
+                  </a:schemeClr>
+                </a:gs>
+                <a:gs pos="75000">
+                  <a:schemeClr val="bg2">
+                    <a:lumMod val="25000"/>
+                  </a:schemeClr>
+                </a:gs>
+                <a:gs pos="60000">
+                  <a:schemeClr val="tx1">
+                    <a:lumMod val="75000"/>
+                    <a:lumOff val="25000"/>
+                  </a:schemeClr>
+                </a:gs>
+                <a:gs pos="100000">
+                  <a:schemeClr val="tx1">
+                    <a:lumMod val="88000"/>
+                    <a:lumOff val="12000"/>
+                  </a:schemeClr>
+                </a:gs>
+              </a:gsLst>
+              <a:path path="circle">
+                <a:fillToRect l="100000" t="100000"/>
+              </a:path>
+              <a:tileRect r="-100000" b="-100000"/>
+            </a:gradFill>
+            <a:ln w="127000">
+              <a:solidFill>
+                <a:schemeClr val="bg1"/>
+              </a:solidFill>
+            </a:ln>
+          </p:spPr>
+          <p:style>
+            <a:lnRef idx="2">
+              <a:schemeClr val="accent1">
+                <a:shade val="50000"/>
+              </a:schemeClr>
+            </a:lnRef>
+            <a:fillRef idx="1">
+              <a:schemeClr val="accent1"/>
+            </a:fillRef>
+            <a:effectRef idx="0">
+              <a:schemeClr val="accent1"/>
+            </a:effectRef>
+            <a:fontRef idx="minor">
+              <a:schemeClr val="lt1"/>
+            </a:fontRef>
+          </p:style>
+          <p:txBody>
+            <a:bodyPr rtlCol="0" anchor="ctr"/>
+            <a:lstStyle/>
+            <a:p>
+              <a:pPr algn="ctr"/>
+              <a:endParaRPr lang="en-US"/>
+            </a:p>
+          </p:txBody>
+        </p:sp>
+        <p:sp>
+          <p:nvSpPr>
+            <p:cNvPr id="4" name="Moon 3">
+              <a:extLst>
+                <a:ext uri="{FF2B5EF4-FFF2-40B4-BE49-F238E27FC236}">
+                  <a16:creationId xmlns:a16="http://schemas.microsoft.com/office/drawing/2014/main" id="{31E32FB5-95C2-7646-9BE6-36F1845599F3}"/>
+                </a:ext>
+              </a:extLst>
+            </p:cNvPr>
+            <p:cNvSpPr/>
+            <p:nvPr/>
+          </p:nvSpPr>
+          <p:spPr>
+            <a:xfrm rot="6300000">
+              <a:off x="5752470" y="5767571"/>
+              <a:ext cx="1373666" cy="1610411"/>
+            </a:xfrm>
+            <a:prstGeom prst="moon">
+              <a:avLst>
+                <a:gd name="adj" fmla="val 87500"/>
+              </a:avLst>
+            </a:prstGeom>
+            <a:solidFill>
+              <a:sysClr val="window" lastClr="FFFFFF"/>
+            </a:solidFill>
+            <a:ln w="76200" cap="rnd" cmpd="sng" algn="ctr">
+              <a:noFill/>
+              <a:prstDash val="solid"/>
+            </a:ln>
+            <a:effectLst/>
+          </p:spPr>
+          <p:txBody>
+            <a:bodyPr rot="0" spcFirstLastPara="0" vertOverflow="overflow" horzOverflow="overflow" vert="horz" wrap="square" lIns="74581" tIns="37290" rIns="74581" bIns="37290" numCol="1" spcCol="0" rtlCol="0" fromWordArt="0" anchor="ctr" anchorCtr="0" forceAA="0" compatLnSpc="1">
+              <a:prstTxWarp prst="textNoShape">
+                <a:avLst/>
+              </a:prstTxWarp>
+              <a:noAutofit/>
+            </a:bodyPr>
+            <a:lstStyle/>
+            <a:p>
+              <a:pPr algn="ctr" defTabSz="372892"/>
+              <a:endParaRPr lang="en-US" sz="1468" kern="0">
+                <a:solidFill>
+                  <a:prstClr val="white"/>
+                </a:solidFill>
+                <a:latin typeface="Century Gothic" panose="020B0502020202020204"/>
+              </a:endParaRPr>
+            </a:p>
+          </p:txBody>
+        </p:sp>
+        <p:sp>
+          <p:nvSpPr>
+            <p:cNvPr id="5" name="Moon 4">
+              <a:extLst>
+                <a:ext uri="{FF2B5EF4-FFF2-40B4-BE49-F238E27FC236}">
+                  <a16:creationId xmlns:a16="http://schemas.microsoft.com/office/drawing/2014/main" id="{7245BE2C-673E-4A4E-8E8F-5866210F24BB}"/>
+                </a:ext>
+              </a:extLst>
+            </p:cNvPr>
+            <p:cNvSpPr/>
+            <p:nvPr/>
+          </p:nvSpPr>
+          <p:spPr>
+            <a:xfrm rot="13180050" flipV="1">
+              <a:off x="5752470" y="3249580"/>
+              <a:ext cx="1373666" cy="1610411"/>
+            </a:xfrm>
+            <a:prstGeom prst="moon">
+              <a:avLst>
+                <a:gd name="adj" fmla="val 87500"/>
+              </a:avLst>
+            </a:prstGeom>
+            <a:solidFill>
+              <a:sysClr val="window" lastClr="FFFFFF"/>
+            </a:solidFill>
+            <a:ln w="76200" cap="rnd" cmpd="sng" algn="ctr">
+              <a:noFill/>
+              <a:prstDash val="solid"/>
+            </a:ln>
+            <a:effectLst/>
+          </p:spPr>
+          <p:txBody>
+            <a:bodyPr rot="0" spcFirstLastPara="0" vertOverflow="overflow" horzOverflow="overflow" vert="horz" wrap="square" lIns="74581" tIns="37290" rIns="74581" bIns="37290" numCol="1" spcCol="0" rtlCol="0" fromWordArt="0" anchor="ctr" anchorCtr="0" forceAA="0" compatLnSpc="1">
+              <a:prstTxWarp prst="textNoShape">
+                <a:avLst/>
+              </a:prstTxWarp>
+              <a:noAutofit/>
+            </a:bodyPr>
+            <a:lstStyle/>
+            <a:p>
+              <a:pPr algn="ctr" defTabSz="372892"/>
+              <a:endParaRPr lang="en-US" sz="1468" kern="0">
+                <a:solidFill>
+                  <a:prstClr val="white"/>
+                </a:solidFill>
+                <a:latin typeface="Century Gothic" panose="020B0502020202020204"/>
+              </a:endParaRPr>
+            </a:p>
+          </p:txBody>
+        </p:sp>
+        <p:sp>
+          <p:nvSpPr>
+            <p:cNvPr id="6" name="Moon 5">
+              <a:extLst>
+                <a:ext uri="{FF2B5EF4-FFF2-40B4-BE49-F238E27FC236}">
+                  <a16:creationId xmlns:a16="http://schemas.microsoft.com/office/drawing/2014/main" id="{337687F4-D0AF-B94B-A478-416F6BE528C4}"/>
+                </a:ext>
+              </a:extLst>
+            </p:cNvPr>
+            <p:cNvSpPr/>
+            <p:nvPr/>
+          </p:nvSpPr>
+          <p:spPr>
+            <a:xfrm rot="3019950" flipH="1" flipV="1">
+              <a:off x="2660207" y="5938425"/>
+              <a:ext cx="1373666" cy="1610411"/>
+            </a:xfrm>
+            <a:prstGeom prst="moon">
+              <a:avLst>
+                <a:gd name="adj" fmla="val 87500"/>
+              </a:avLst>
+            </a:prstGeom>
+            <a:solidFill>
+              <a:sysClr val="window" lastClr="FFFFFF"/>
+            </a:solidFill>
+            <a:ln w="76200" cap="rnd" cmpd="sng" algn="ctr">
+              <a:noFill/>
+              <a:prstDash val="solid"/>
+            </a:ln>
+            <a:effectLst/>
+          </p:spPr>
+          <p:txBody>
+            <a:bodyPr rot="0" spcFirstLastPara="0" vertOverflow="overflow" horzOverflow="overflow" vert="horz" wrap="square" lIns="74581" tIns="37290" rIns="74581" bIns="37290" numCol="1" spcCol="0" rtlCol="0" fromWordArt="0" anchor="ctr" anchorCtr="0" forceAA="0" compatLnSpc="1">
+              <a:prstTxWarp prst="textNoShape">
+                <a:avLst/>
+              </a:prstTxWarp>
+              <a:noAutofit/>
+            </a:bodyPr>
+            <a:lstStyle/>
+            <a:p>
+              <a:pPr algn="ctr" defTabSz="372892"/>
+              <a:endParaRPr lang="en-US" sz="1468" kern="0">
+                <a:solidFill>
+                  <a:prstClr val="white"/>
+                </a:solidFill>
+                <a:latin typeface="Century Gothic" panose="020B0502020202020204"/>
+              </a:endParaRPr>
+            </a:p>
+          </p:txBody>
+        </p:sp>
+        <p:sp>
+          <p:nvSpPr>
+            <p:cNvPr id="7" name="Moon 6">
+              <a:extLst>
+                <a:ext uri="{FF2B5EF4-FFF2-40B4-BE49-F238E27FC236}">
+                  <a16:creationId xmlns:a16="http://schemas.microsoft.com/office/drawing/2014/main" id="{5D30C5F7-9BBB-824F-A0F2-A36C5BB762C9}"/>
+                </a:ext>
+              </a:extLst>
+            </p:cNvPr>
+            <p:cNvSpPr/>
+            <p:nvPr/>
+          </p:nvSpPr>
+          <p:spPr>
+            <a:xfrm rot="2643684" flipH="1" flipV="1">
+              <a:off x="2549005" y="3277498"/>
+              <a:ext cx="2020641" cy="1554579"/>
+            </a:xfrm>
+            <a:prstGeom prst="moon">
+              <a:avLst>
+                <a:gd name="adj" fmla="val 61063"/>
+              </a:avLst>
+            </a:prstGeom>
+            <a:solidFill>
+              <a:sysClr val="window" lastClr="FFFFFF"/>
+            </a:solidFill>
+            <a:ln w="76200" cap="rnd" cmpd="sng" algn="ctr">
+              <a:noFill/>
+              <a:prstDash val="solid"/>
+            </a:ln>
+            <a:effectLst/>
+          </p:spPr>
+          <p:txBody>
+            <a:bodyPr rot="0" spcFirstLastPara="0" vertOverflow="overflow" horzOverflow="overflow" vert="horz" wrap="square" lIns="74581" tIns="37290" rIns="74581" bIns="37290" numCol="1" spcCol="0" rtlCol="0" fromWordArt="0" anchor="ctr" anchorCtr="0" forceAA="0" compatLnSpc="1">
+              <a:prstTxWarp prst="textNoShape">
+                <a:avLst/>
+              </a:prstTxWarp>
+              <a:noAutofit/>
+            </a:bodyPr>
+            <a:lstStyle/>
+            <a:p>
+              <a:pPr algn="ctr" defTabSz="372892"/>
+              <a:endParaRPr lang="en-US" sz="1468" kern="0">
+                <a:solidFill>
+                  <a:prstClr val="white"/>
+                </a:solidFill>
+                <a:latin typeface="Century Gothic" panose="020B0502020202020204"/>
+              </a:endParaRPr>
+            </a:p>
+          </p:txBody>
+        </p:sp>
+        <p:pic>
+          <p:nvPicPr>
+            <p:cNvPr id="8" name="Picture 7">
+              <a:extLst>
+                <a:ext uri="{FF2B5EF4-FFF2-40B4-BE49-F238E27FC236}">
+                  <a16:creationId xmlns:a16="http://schemas.microsoft.com/office/drawing/2014/main" id="{897F92BF-0179-E34A-A66A-9E48E7FDB483}"/>
+                </a:ext>
+              </a:extLst>
+            </p:cNvPr>
+            <p:cNvPicPr>
+              <a:picLocks noChangeAspect="1"/>
+            </p:cNvPicPr>
+            <p:nvPr/>
+          </p:nvPicPr>
+          <p:blipFill>
+            <a:blip r:embed="rId2"/>
+            <a:stretch>
+              <a:fillRect/>
+            </a:stretch>
+          </p:blipFill>
+          <p:spPr>
+            <a:xfrm>
+              <a:off x="2622897" y="3142156"/>
+              <a:ext cx="4404375" cy="4404375"/>
+            </a:xfrm>
+            <a:prstGeom prst="rect">
+              <a:avLst/>
+            </a:prstGeom>
+          </p:spPr>
+        </p:pic>
+      </p:grpSp>
+    </p:spTree>
+    <p:extLst>
+      <p:ext uri="{BB962C8B-B14F-4D97-AF65-F5344CB8AC3E}">
+        <p14:creationId xmlns:p14="http://schemas.microsoft.com/office/powerpoint/2010/main" val="489090678"/>
+      </p:ext>
+    </p:extLst>
+  </p:cSld>
+  <p:clrMapOvr>
+    <a:masterClrMapping/>
+  </p:clrMapOvr>
+</p:sld>
+</file>
+
+<file path=ppt/slides/slide3.xml><?xml version="1.0" encoding="utf-8"?>
+<p:sld xmlns:a="http://schemas.openxmlformats.org/drawingml/2006/main" xmlns:r="http://schemas.openxmlformats.org/officeDocument/2006/relationships" xmlns:p="http://schemas.openxmlformats.org/presentationml/2006/main">
+  <p:cSld>
+    <p:spTree>
+      <p:nvGrpSpPr>
+        <p:cNvPr id="1" name=""/>
+        <p:cNvGrpSpPr/>
+        <p:nvPr/>
+      </p:nvGrpSpPr>
+      <p:grpSpPr>
+        <a:xfrm>
+          <a:off x="0" y="0"/>
+          <a:ext cx="0" cy="0"/>
+          <a:chOff x="0" y="0"/>
+          <a:chExt cx="0" cy="0"/>
+        </a:xfrm>
+      </p:grpSpPr>
       <p:grpSp>
         <p:nvGrpSpPr>
           <p:cNvPr id="10" name="Group 9">

</xml_diff>